<commit_message>
cambio portada max likelihood
</commit_message>
<xml_diff>
--- a/03_simulacion/casos_codigo/clase06_fit_distribucion_lugones/seminario_max_like.pptx
+++ b/03_simulacion/casos_codigo/clase06_fit_distribucion_lugones/seminario_max_like.pptx
@@ -4857,7 +4857,7 @@
             </a:pPr>
             <a:r>
               <a:rPr lang="en" sz="2070" dirty="0"/>
-              <a:t>Curso: I4051</a:t>
+              <a:t>Elaborado por: Rodrigo Maranzana</a:t>
             </a:r>
             <a:endParaRPr sz="2070" dirty="0"/>
           </a:p>
@@ -4877,40 +4877,13 @@
               <a:buNone/>
             </a:pPr>
             <a:r>
-              <a:rPr lang="en" sz="2070" dirty="0"/>
-              <a:t>Elaborado por</a:t>
+              <a:rPr lang="en-US" sz="2070" dirty="0" err="1"/>
+              <a:t>Curso</a:t>
             </a:r>
             <a:r>
-              <a:rPr lang="en" sz="2070"/>
-              <a:t>: Rodrigo Maranzana</a:t>
+              <a:rPr lang="en-US" sz="2070" dirty="0"/>
+              <a:t>: I4051 (Prof. Martin Palazzo)</a:t>
             </a:r>
-            <a:endParaRPr sz="2070" dirty="0"/>
-          </a:p>
-          <a:p>
-            <a:pPr marL="0" lvl="0" indent="0" algn="l" rtl="0">
-              <a:spcBef>
-                <a:spcPts val="0"/>
-              </a:spcBef>
-              <a:spcAft>
-                <a:spcPts val="0"/>
-              </a:spcAft>
-              <a:buClr>
-                <a:schemeClr val="dk2"/>
-              </a:buClr>
-              <a:buSzPts val="2070"/>
-              <a:buFont typeface="Arial"/>
-              <a:buNone/>
-            </a:pPr>
-            <a:r>
-              <a:rPr lang="en" sz="2070" dirty="0"/>
-              <a:t>Docente: Martín Palazzo</a:t>
-            </a:r>
-            <a:endParaRPr dirty="0">
-              <a:latin typeface="Helvetica Neue"/>
-              <a:ea typeface="Helvetica Neue"/>
-              <a:cs typeface="Helvetica Neue"/>
-              <a:sym typeface="Helvetica Neue"/>
-            </a:endParaRPr>
           </a:p>
           <a:p>
             <a:pPr marL="0" lvl="0" indent="0" algn="l" rtl="0">

</xml_diff>